<commit_message>
add n-gram LM stuff
</commit_message>
<xml_diff>
--- a/slides/WSTA_L13_discourse.pptx
+++ b/slides/WSTA_L13_discourse.pptx
@@ -894,7 +894,7 @@
           </a:ln>
           <a:extLst>
             <a:ext uri="{C572A759-6A51-4108-AA02-DFA0A04FC94B}">
-              <ma14:wrappingTextBoxFlag xmlns:ma14="http://schemas.microsoft.com/office/mac/drawingml/2011/main" xmlns="" val="1"/>
+              <ma14:wrappingTextBoxFlag xmlns="" xmlns:ma14="http://schemas.microsoft.com/office/mac/drawingml/2011/main" val="1"/>
             </a:ext>
           </a:extLst>
         </p:spPr>
@@ -2572,7 +2572,7 @@
           </a:ln>
           <a:extLst>
             <a:ext uri="{C572A759-6A51-4108-AA02-DFA0A04FC94B}">
-              <ma14:wrappingTextBoxFlag xmlns:ma14="http://schemas.microsoft.com/office/mac/drawingml/2011/main" xmlns="" val="1"/>
+              <ma14:wrappingTextBoxFlag xmlns="" xmlns:ma14="http://schemas.microsoft.com/office/mac/drawingml/2011/main" val="1"/>
             </a:ext>
           </a:extLst>
         </p:spPr>
@@ -2612,7 +2612,7 @@
           </a:ln>
           <a:extLst>
             <a:ext uri="{C572A759-6A51-4108-AA02-DFA0A04FC94B}">
-              <ma14:wrappingTextBoxFlag xmlns:ma14="http://schemas.microsoft.com/office/mac/drawingml/2011/main" xmlns="" val="1"/>
+              <ma14:wrappingTextBoxFlag xmlns="" xmlns:ma14="http://schemas.microsoft.com/office/mac/drawingml/2011/main" val="1"/>
             </a:ext>
           </a:extLst>
         </p:spPr>
@@ -6954,7 +6954,15 @@
             </a:r>
             <a:r>
               <a:rPr lang="en-AU" dirty="0" smtClean="0"/>
-              <a:t> 21.1-21.3 , 21.5-21.6</a:t>
+              <a:t> </a:t>
+            </a:r>
+            <a:r>
+              <a:rPr lang="en-AU" dirty="0" smtClean="0"/>
+              <a:t>21.1-21.3, </a:t>
+            </a:r>
+            <a:r>
+              <a:rPr lang="en-AU" dirty="0" smtClean="0"/>
+              <a:t>21.5-21.6</a:t>
             </a:r>
           </a:p>
           <a:p>

</xml_diff>

<commit_message>
Fixed discourse slides bug
</commit_message>
<xml_diff>
--- a/slides/WSTA_L13_discourse.pptx
+++ b/slides/WSTA_L13_discourse.pptx
@@ -894,7 +894,7 @@
           </a:ln>
           <a:extLst>
             <a:ext uri="{C572A759-6A51-4108-AA02-DFA0A04FC94B}">
-              <ma14:wrappingTextBoxFlag xmlns="" xmlns:ma14="http://schemas.microsoft.com/office/mac/drawingml/2011/main" val="1"/>
+              <ma14:wrappingTextBoxFlag xmlns:ma14="http://schemas.microsoft.com/office/mac/drawingml/2011/main" xmlns="" val="1"/>
             </a:ext>
           </a:extLst>
         </p:spPr>
@@ -2572,7 +2572,7 @@
           </a:ln>
           <a:extLst>
             <a:ext uri="{C572A759-6A51-4108-AA02-DFA0A04FC94B}">
-              <ma14:wrappingTextBoxFlag xmlns="" xmlns:ma14="http://schemas.microsoft.com/office/mac/drawingml/2011/main" val="1"/>
+              <ma14:wrappingTextBoxFlag xmlns:ma14="http://schemas.microsoft.com/office/mac/drawingml/2011/main" xmlns="" val="1"/>
             </a:ext>
           </a:extLst>
         </p:spPr>
@@ -2612,7 +2612,7 @@
           </a:ln>
           <a:extLst>
             <a:ext uri="{C572A759-6A51-4108-AA02-DFA0A04FC94B}">
-              <ma14:wrappingTextBoxFlag xmlns="" xmlns:ma14="http://schemas.microsoft.com/office/mac/drawingml/2011/main" val="1"/>
+              <ma14:wrappingTextBoxFlag xmlns:ma14="http://schemas.microsoft.com/office/mac/drawingml/2011/main" xmlns="" val="1"/>
             </a:ext>
           </a:extLst>
         </p:spPr>
@@ -5435,19 +5435,19 @@
           <a:p>
             <a:pPr lvl="1"/>
             <a:r>
-              <a:rPr lang="en-AU" dirty="0" err="1"/>
+              <a:rPr lang="en-AU" smtClean="0"/>
               <a:t>C</a:t>
             </a:r>
             <a:r>
               <a:rPr lang="en-AU" baseline="-25000" dirty="0" err="1"/>
-              <a:t>b</a:t>
-            </a:r>
-            <a:r>
-              <a:rPr lang="en-AU" dirty="0"/>
+              <a:t>p</a:t>
+            </a:r>
+            <a:r>
+              <a:rPr lang="en-AU" smtClean="0"/>
               <a:t>(U</a:t>
             </a:r>
             <a:r>
-              <a:rPr lang="en-AU" baseline="-25000" dirty="0"/>
+              <a:rPr lang="en-AU" baseline="-25000" smtClean="0"/>
               <a:t>n</a:t>
             </a:r>
             <a:r>
@@ -6954,15 +6954,7 @@
             </a:r>
             <a:r>
               <a:rPr lang="en-AU" dirty="0" smtClean="0"/>
-              <a:t> </a:t>
-            </a:r>
-            <a:r>
-              <a:rPr lang="en-AU" dirty="0" smtClean="0"/>
-              <a:t>21.1-21.3, </a:t>
-            </a:r>
-            <a:r>
-              <a:rPr lang="en-AU" dirty="0" smtClean="0"/>
-              <a:t>21.5-21.6</a:t>
+              <a:t> 21.1-21.3, 21.5-21.6</a:t>
             </a:r>
           </a:p>
           <a:p>

</xml_diff>